<commit_message>
schema + robustness changes
</commit_message>
<xml_diff>
--- a/img/schema V2.pptx
+++ b/img/schema V2.pptx
@@ -3579,62 +3579,155 @@
             </a:p>
           </p:txBody>
         </p:sp>
-        <p:sp>
-          <p:nvSpPr>
-            <p:cNvPr id="19" name="Textfeld 18">
-              <a:extLst>
-                <a:ext uri="{FF2B5EF4-FFF2-40B4-BE49-F238E27FC236}">
-                  <a16:creationId xmlns:a16="http://schemas.microsoft.com/office/drawing/2014/main" id="{E2C2D1A6-EFAD-432A-A1E8-96362F6801F6}"/>
-                </a:ext>
-              </a:extLst>
-            </p:cNvPr>
-            <p:cNvSpPr txBox="1"/>
-            <p:nvPr/>
-          </p:nvSpPr>
-          <p:spPr>
-            <a:xfrm>
-              <a:off x="8537239" y="3887925"/>
-              <a:ext cx="3264366" cy="1015663"/>
-            </a:xfrm>
-            <a:prstGeom prst="rect">
-              <a:avLst/>
-            </a:prstGeom>
-            <a:noFill/>
-          </p:spPr>
-          <p:txBody>
-            <a:bodyPr wrap="square" rtlCol="0">
-              <a:spAutoFit/>
-            </a:bodyPr>
-            <a:lstStyle/>
-            <a:p>
-              <a:r>
-                <a:rPr lang="de-DE" sz="2000" dirty="0">
-                  <a:latin typeface="Cambria Math" panose="02040503050406030204" pitchFamily="18" charset="0"/>
-                  <a:ea typeface="Cambria Math" panose="02040503050406030204" pitchFamily="18" charset="0"/>
-                </a:rPr>
-                <a:t>strategy 2: </a:t>
-              </a:r>
-            </a:p>
-            <a:p>
-              <a:r>
-                <a:rPr lang="de-DE" sz="2000" dirty="0">
-                  <a:latin typeface="Cambria Math" panose="02040503050406030204" pitchFamily="18" charset="0"/>
-                  <a:ea typeface="Cambria Math" panose="02040503050406030204" pitchFamily="18" charset="0"/>
-                </a:rPr>
-                <a:t>best match with </a:t>
-              </a:r>
-            </a:p>
-            <a:p>
-              <a:r>
-                <a:rPr lang="de-DE" sz="2000" dirty="0">
-                  <a:latin typeface="Cambria Math" panose="02040503050406030204" pitchFamily="18" charset="0"/>
-                  <a:ea typeface="Cambria Math" panose="02040503050406030204" pitchFamily="18" charset="0"/>
-                </a:rPr>
-                <a:t>consensus clustering C*</a:t>
-              </a:r>
-            </a:p>
-          </p:txBody>
-        </p:sp>
+        <mc:AlternateContent xmlns:mc="http://schemas.openxmlformats.org/markup-compatibility/2006">
+          <mc:Choice xmlns:a14="http://schemas.microsoft.com/office/drawing/2010/main" Requires="a14">
+            <p:sp>
+              <p:nvSpPr>
+                <p:cNvPr id="19" name="Textfeld 18">
+                  <a:extLst>
+                    <a:ext uri="{FF2B5EF4-FFF2-40B4-BE49-F238E27FC236}">
+                      <a16:creationId xmlns:a16="http://schemas.microsoft.com/office/drawing/2014/main" id="{E2C2D1A6-EFAD-432A-A1E8-96362F6801F6}"/>
+                    </a:ext>
+                  </a:extLst>
+                </p:cNvPr>
+                <p:cNvSpPr txBox="1"/>
+                <p:nvPr/>
+              </p:nvSpPr>
+              <p:spPr>
+                <a:xfrm>
+                  <a:off x="8537239" y="3887925"/>
+                  <a:ext cx="3264366" cy="1015663"/>
+                </a:xfrm>
+                <a:prstGeom prst="rect">
+                  <a:avLst/>
+                </a:prstGeom>
+                <a:noFill/>
+              </p:spPr>
+              <p:txBody>
+                <a:bodyPr wrap="square" rtlCol="0">
+                  <a:spAutoFit/>
+                </a:bodyPr>
+                <a:lstStyle/>
+                <a:p>
+                  <a:r>
+                    <a:rPr lang="de-DE" sz="2000" i="1" dirty="0" err="1">
+                      <a:latin typeface="Cambria Math" panose="02040503050406030204" pitchFamily="18" charset="0"/>
+                      <a:ea typeface="Cambria Math" panose="02040503050406030204" pitchFamily="18" charset="0"/>
+                    </a:rPr>
+                    <a:t>Strategy</a:t>
+                  </a:r>
+                  <a:r>
+                    <a:rPr lang="de-DE" sz="2000" i="1" dirty="0">
+                      <a:latin typeface="Cambria Math" panose="02040503050406030204" pitchFamily="18" charset="0"/>
+                      <a:ea typeface="Cambria Math" panose="02040503050406030204" pitchFamily="18" charset="0"/>
+                    </a:rPr>
+                    <a:t> 2</a:t>
+                  </a:r>
+                  <a:r>
+                    <a:rPr lang="de-DE" sz="2000" dirty="0">
+                      <a:latin typeface="Cambria Math" panose="02040503050406030204" pitchFamily="18" charset="0"/>
+                      <a:ea typeface="Cambria Math" panose="02040503050406030204" pitchFamily="18" charset="0"/>
+                    </a:rPr>
+                    <a:t>: </a:t>
+                  </a:r>
+                </a:p>
+                <a:p>
+                  <a:r>
+                    <a:rPr lang="de-DE" sz="2000" dirty="0">
+                      <a:latin typeface="Cambria Math" panose="02040503050406030204" pitchFamily="18" charset="0"/>
+                      <a:ea typeface="Cambria Math" panose="02040503050406030204" pitchFamily="18" charset="0"/>
+                    </a:rPr>
+                    <a:t>best match with </a:t>
+                  </a:r>
+                </a:p>
+                <a:p>
+                  <a:r>
+                    <a:rPr lang="de-DE" sz="2000" dirty="0">
+                      <a:latin typeface="Cambria Math" panose="02040503050406030204" pitchFamily="18" charset="0"/>
+                      <a:ea typeface="Cambria Math" panose="02040503050406030204" pitchFamily="18" charset="0"/>
+                    </a:rPr>
+                    <a:t>consensus clustering </a:t>
+                  </a:r>
+                  <a14:m>
+                    <m:oMath xmlns:m="http://schemas.openxmlformats.org/officeDocument/2006/math">
+                      <m:sSup>
+                        <m:sSupPr>
+                          <m:ctrlPr>
+                            <a:rPr lang="de-DE" sz="2000" i="1">
+                              <a:latin typeface="Cambria Math" panose="02040503050406030204" pitchFamily="18" charset="0"/>
+                            </a:rPr>
+                          </m:ctrlPr>
+                        </m:sSupPr>
+                        <m:e>
+                          <m:r>
+                            <a:rPr lang="de-DE" sz="2000" i="1">
+                              <a:latin typeface="Cambria Math" panose="02040503050406030204" pitchFamily="18" charset="0"/>
+                              <a:ea typeface="Cambria Math" panose="02040503050406030204" pitchFamily="18" charset="0"/>
+                            </a:rPr>
+                            <m:t>𝒞</m:t>
+                          </m:r>
+                        </m:e>
+                        <m:sup>
+                          <m:r>
+                            <a:rPr lang="de-DE" sz="2000">
+                              <a:latin typeface="Cambria Math" panose="02040503050406030204" pitchFamily="18" charset="0"/>
+                            </a:rPr>
+                            <m:t>∗</m:t>
+                          </m:r>
+                        </m:sup>
+                      </m:sSup>
+                    </m:oMath>
+                  </a14:m>
+                  <a:endParaRPr lang="de-DE" sz="2000" dirty="0"/>
+                </a:p>
+              </p:txBody>
+            </p:sp>
+          </mc:Choice>
+          <mc:Fallback>
+            <p:sp>
+              <p:nvSpPr>
+                <p:cNvPr id="19" name="Textfeld 18">
+                  <a:extLst>
+                    <a:ext uri="{FF2B5EF4-FFF2-40B4-BE49-F238E27FC236}">
+                      <a16:creationId xmlns:a16="http://schemas.microsoft.com/office/drawing/2014/main" id="{E2C2D1A6-EFAD-432A-A1E8-96362F6801F6}"/>
+                    </a:ext>
+                  </a:extLst>
+                </p:cNvPr>
+                <p:cNvSpPr txBox="1">
+                  <a:spLocks noRot="1" noChangeAspect="1" noMove="1" noResize="1" noEditPoints="1" noAdjustHandles="1" noChangeArrowheads="1" noChangeShapeType="1" noTextEdit="1"/>
+                </p:cNvSpPr>
+                <p:nvPr/>
+              </p:nvSpPr>
+              <p:spPr>
+                <a:xfrm>
+                  <a:off x="8537239" y="3887925"/>
+                  <a:ext cx="3264366" cy="1015663"/>
+                </a:xfrm>
+                <a:prstGeom prst="rect">
+                  <a:avLst/>
+                </a:prstGeom>
+                <a:blipFill>
+                  <a:blip r:embed="rId2"/>
+                  <a:stretch>
+                    <a:fillRect l="-1866" t="-2994" b="-8383"/>
+                  </a:stretch>
+                </a:blipFill>
+              </p:spPr>
+              <p:txBody>
+                <a:bodyPr/>
+                <a:lstStyle/>
+                <a:p>
+                  <a:r>
+                    <a:rPr lang="de-DE">
+                      <a:noFill/>
+                    </a:rPr>
+                    <a:t> </a:t>
+                  </a:r>
+                </a:p>
+              </p:txBody>
+            </p:sp>
+          </mc:Fallback>
+        </mc:AlternateContent>
         <p:sp>
           <p:nvSpPr>
             <p:cNvPr id="16" name="Rechteck 15">
@@ -3939,7 +4032,7 @@
                   <a:avLst/>
                 </a:prstGeom>
                 <a:blipFill>
-                  <a:blip r:embed="rId2"/>
+                  <a:blip r:embed="rId3"/>
                   <a:stretch>
                     <a:fillRect/>
                   </a:stretch>
@@ -4090,7 +4183,7 @@
               <p:nvPr/>
             </p:nvPicPr>
             <p:blipFill>
-              <a:blip r:embed="rId3" cstate="hqprint">
+              <a:blip r:embed="rId4" cstate="hqprint">
                 <a:extLst>
                   <a:ext uri="{28A0092B-C50C-407E-A947-70E740481C1C}">
                     <a14:useLocalDpi xmlns:a14="http://schemas.microsoft.com/office/drawing/2010/main"/>
@@ -4137,7 +4230,7 @@
               <p:nvPr/>
             </p:nvPicPr>
             <p:blipFill>
-              <a:blip r:embed="rId4" cstate="hqprint">
+              <a:blip r:embed="rId5" cstate="hqprint">
                 <a:extLst>
                   <a:ext uri="{28A0092B-C50C-407E-A947-70E740481C1C}">
                     <a14:useLocalDpi xmlns:a14="http://schemas.microsoft.com/office/drawing/2010/main"/>
@@ -4184,7 +4277,7 @@
               <p:nvPr/>
             </p:nvPicPr>
             <p:blipFill>
-              <a:blip r:embed="rId5" cstate="hqprint">
+              <a:blip r:embed="rId6" cstate="hqprint">
                 <a:extLst>
                   <a:ext uri="{28A0092B-C50C-407E-A947-70E740481C1C}">
                     <a14:useLocalDpi xmlns:a14="http://schemas.microsoft.com/office/drawing/2010/main"/>
@@ -4231,7 +4324,7 @@
               <p:nvPr/>
             </p:nvPicPr>
             <p:blipFill>
-              <a:blip r:embed="rId6" cstate="hqprint">
+              <a:blip r:embed="rId7" cstate="hqprint">
                 <a:extLst>
                   <a:ext uri="{28A0092B-C50C-407E-A947-70E740481C1C}">
                     <a14:useLocalDpi xmlns:a14="http://schemas.microsoft.com/office/drawing/2010/main"/>
@@ -4299,7 +4392,7 @@
               <p:nvPr/>
             </p:nvPicPr>
             <p:blipFill>
-              <a:blip r:embed="rId3" cstate="hqprint">
+              <a:blip r:embed="rId4" cstate="hqprint">
                 <a:extLst>
                   <a:ext uri="{28A0092B-C50C-407E-A947-70E740481C1C}">
                     <a14:useLocalDpi xmlns:a14="http://schemas.microsoft.com/office/drawing/2010/main"/>
@@ -4346,7 +4439,7 @@
               <p:nvPr/>
             </p:nvPicPr>
             <p:blipFill>
-              <a:blip r:embed="rId4" cstate="hqprint">
+              <a:blip r:embed="rId5" cstate="hqprint">
                 <a:extLst>
                   <a:ext uri="{28A0092B-C50C-407E-A947-70E740481C1C}">
                     <a14:useLocalDpi xmlns:a14="http://schemas.microsoft.com/office/drawing/2010/main"/>
@@ -4393,7 +4486,7 @@
               <p:nvPr/>
             </p:nvPicPr>
             <p:blipFill>
-              <a:blip r:embed="rId5" cstate="hqprint">
+              <a:blip r:embed="rId6" cstate="hqprint">
                 <a:extLst>
                   <a:ext uri="{28A0092B-C50C-407E-A947-70E740481C1C}">
                     <a14:useLocalDpi xmlns:a14="http://schemas.microsoft.com/office/drawing/2010/main"/>
@@ -4437,7 +4530,7 @@
               <p:nvPr/>
             </p:nvPicPr>
             <p:blipFill>
-              <a:blip r:embed="rId6" cstate="hqprint">
+              <a:blip r:embed="rId7" cstate="hqprint">
                 <a:extLst>
                   <a:ext uri="{28A0092B-C50C-407E-A947-70E740481C1C}">
                     <a14:useLocalDpi xmlns:a14="http://schemas.microsoft.com/office/drawing/2010/main"/>
@@ -4485,7 +4578,7 @@
             <p:nvPr/>
           </p:nvPicPr>
           <p:blipFill>
-            <a:blip r:embed="rId7" cstate="hqprint">
+            <a:blip r:embed="rId8" cstate="hqprint">
               <a:extLst>
                 <a:ext uri="{28A0092B-C50C-407E-A947-70E740481C1C}">
                   <a14:useLocalDpi xmlns:a14="http://schemas.microsoft.com/office/drawing/2010/main"/>
@@ -4514,8 +4607,8 @@
             </a:ln>
           </p:spPr>
         </p:pic>
-        <mc:AlternateContent xmlns:mc="http://schemas.openxmlformats.org/markup-compatibility/2006" xmlns:a14="http://schemas.microsoft.com/office/drawing/2010/main">
-          <mc:Choice Requires="a14">
+        <mc:AlternateContent xmlns:mc="http://schemas.openxmlformats.org/markup-compatibility/2006">
+          <mc:Choice xmlns:a14="http://schemas.microsoft.com/office/drawing/2010/main" Requires="a14">
             <p:sp>
               <p:nvSpPr>
                 <p:cNvPr id="44" name="Textfeld 43">
@@ -4564,13 +4657,11 @@
                           </m:sSupPr>
                           <m:e>
                             <m:r>
-                              <m:rPr>
-                                <m:sty m:val="p"/>
-                              </m:rPr>
-                              <a:rPr lang="de-DE" sz="4000">
+                              <a:rPr lang="de-DE" sz="4000" i="1" smtClean="0">
                                 <a:latin typeface="Cambria Math" panose="02040503050406030204" pitchFamily="18" charset="0"/>
+                                <a:ea typeface="Cambria Math" panose="02040503050406030204" pitchFamily="18" charset="0"/>
                               </a:rPr>
-                              <m:t>C</m:t>
+                              <m:t>𝒞</m:t>
                             </m:r>
                           </m:e>
                           <m:sup>
@@ -4590,7 +4681,7 @@
               </p:txBody>
             </p:sp>
           </mc:Choice>
-          <mc:Fallback xmlns="">
+          <mc:Fallback>
             <p:sp>
               <p:nvSpPr>
                 <p:cNvPr id="44" name="Textfeld 43">
@@ -4614,9 +4705,9 @@
                   <a:avLst/>
                 </a:prstGeom>
                 <a:blipFill>
-                  <a:blip r:embed="rId8"/>
+                  <a:blip r:embed="rId9"/>
                   <a:stretch>
-                    <a:fillRect r="-3409"/>
+                    <a:fillRect r="-10227"/>
                   </a:stretch>
                 </a:blipFill>
                 <a:ln>
@@ -4716,11 +4807,25 @@
             <a:lstStyle/>
             <a:p>
               <a:r>
+                <a:rPr lang="de-DE" sz="2000" i="1" dirty="0" err="1">
+                  <a:latin typeface="Cambria Math" panose="02040503050406030204" pitchFamily="18" charset="0"/>
+                  <a:ea typeface="Cambria Math" panose="02040503050406030204" pitchFamily="18" charset="0"/>
+                </a:rPr>
+                <a:t>Strategy</a:t>
+              </a:r>
+              <a:r>
+                <a:rPr lang="de-DE" sz="2000" i="1" dirty="0">
+                  <a:latin typeface="Cambria Math" panose="02040503050406030204" pitchFamily="18" charset="0"/>
+                  <a:ea typeface="Cambria Math" panose="02040503050406030204" pitchFamily="18" charset="0"/>
+                </a:rPr>
+                <a:t> 1</a:t>
+              </a:r>
+              <a:r>
                 <a:rPr lang="de-DE" sz="2000" dirty="0">
                   <a:latin typeface="Cambria Math" panose="02040503050406030204" pitchFamily="18" charset="0"/>
                   <a:ea typeface="Cambria Math" panose="02040503050406030204" pitchFamily="18" charset="0"/>
                 </a:rPr>
-                <a:t>strategy 1: ANMI maximization</a:t>
+                <a:t>: ANMI maximization</a:t>
               </a:r>
             </a:p>
           </p:txBody>

</xml_diff>